<commit_message>
fixed typo at slide 8 on failure cascade example
</commit_message>
<xml_diff>
--- a/ProjectDescriptions/P1-Discrete Time Markov Chains.pptx
+++ b/ProjectDescriptions/P1-Discrete Time Markov Chains.pptx
@@ -210,7 +210,7 @@
           <a:p>
             <a:fld id="{A0C1F70C-5BF6-43D2-96A0-6511110BD68E}" type="datetimeFigureOut">
               <a:rPr lang="en-US" smtClean="0"/>
-              <a:t>11/15/2022</a:t>
+              <a:t>11/20/2022</a:t>
             </a:fld>
             <a:endParaRPr lang="en-US"/>
           </a:p>
@@ -2456,7 +2456,7 @@
           <a:p>
             <a:fld id="{D56A5F13-4F86-5646-9B99-A42325757066}" type="datetime1">
               <a:rPr lang="en-US" smtClean="0"/>
-              <a:t>11/15/2022</a:t>
+              <a:t>11/20/2022</a:t>
             </a:fld>
             <a:endParaRPr lang="en-US"/>
           </a:p>
@@ -2745,7 +2745,7 @@
           <a:p>
             <a:fld id="{34C8E77E-B710-C741-B9C3-BDFAF2BD28F5}" type="datetime1">
               <a:rPr lang="en-US" smtClean="0"/>
-              <a:t>11/15/2022</a:t>
+              <a:t>11/20/2022</a:t>
             </a:fld>
             <a:endParaRPr lang="en-US"/>
           </a:p>
@@ -3034,7 +3034,7 @@
           <a:p>
             <a:fld id="{3CC70E32-BC87-A748-B8DC-BBE1A8E155BB}" type="datetime1">
               <a:rPr lang="en-US" smtClean="0"/>
-              <a:t>11/15/2022</a:t>
+              <a:t>11/20/2022</a:t>
             </a:fld>
             <a:endParaRPr lang="en-US"/>
           </a:p>
@@ -3323,7 +3323,7 @@
           <a:p>
             <a:fld id="{FF80D806-2732-D74C-AA54-685EF616F24A}" type="datetime1">
               <a:rPr lang="en-US" smtClean="0"/>
-              <a:t>11/15/2022</a:t>
+              <a:t>11/20/2022</a:t>
             </a:fld>
             <a:endParaRPr lang="en-US"/>
           </a:p>
@@ -3560,7 +3560,7 @@
           <a:p>
             <a:fld id="{7EE62EE2-D39B-DB40-8504-5F31AB3A7B1B}" type="datetime1">
               <a:rPr lang="en-US" smtClean="0"/>
-              <a:t>11/15/2022</a:t>
+              <a:t>11/20/2022</a:t>
             </a:fld>
             <a:endParaRPr lang="en-US"/>
           </a:p>
@@ -4017,7 +4017,7 @@
           <a:p>
             <a:fld id="{F2C6AE98-BAC0-8443-BBA0-C97A4F30D31A}" type="datetime1">
               <a:rPr lang="en-US" smtClean="0"/>
-              <a:t>11/15/2022</a:t>
+              <a:t>11/20/2022</a:t>
             </a:fld>
             <a:endParaRPr lang="en-US"/>
           </a:p>
@@ -4285,7 +4285,7 @@
           <a:p>
             <a:fld id="{88DBBF51-3929-3A49-BA7D-3AF73092A0AD}" type="datetime1">
               <a:rPr lang="en-US" smtClean="0"/>
-              <a:t>11/15/2022</a:t>
+              <a:t>11/20/2022</a:t>
             </a:fld>
             <a:endParaRPr lang="en-US"/>
           </a:p>
@@ -4483,7 +4483,7 @@
           <a:p>
             <a:fld id="{36C5C674-12AF-41F5-BDE5-1132B29F8CB8}" type="datetime1">
               <a:rPr lang="en-US" smtClean="0"/>
-              <a:t>11/15/2022</a:t>
+              <a:t>11/20/2022</a:t>
             </a:fld>
             <a:endParaRPr lang="en-US"/>
           </a:p>
@@ -6856,7 +6856,7 @@
           <a:p>
             <a:fld id="{3D457031-A04F-0040-B79E-439CA9E02781}" type="datetime1">
               <a:rPr lang="en-US" smtClean="0"/>
-              <a:t>11/15/2022</a:t>
+              <a:t>11/20/2022</a:t>
             </a:fld>
             <a:endParaRPr lang="en-US"/>
           </a:p>
@@ -7106,7 +7106,7 @@
           <a:p>
             <a:fld id="{641269E8-56DE-E044-B0E5-B498755A2633}" type="datetime1">
               <a:rPr lang="en-US" smtClean="0"/>
-              <a:t>11/15/2022</a:t>
+              <a:t>11/20/2022</a:t>
             </a:fld>
             <a:endParaRPr lang="en-US"/>
           </a:p>
@@ -7492,7 +7492,7 @@
           <a:p>
             <a:fld id="{219B2A40-E9E6-7E49-9EE5-F8C2FAB652F4}" type="datetime1">
               <a:rPr lang="en-US" smtClean="0"/>
-              <a:t>11/15/2022</a:t>
+              <a:t>11/20/2022</a:t>
             </a:fld>
             <a:endParaRPr lang="en-US"/>
           </a:p>
@@ -7752,7 +7752,7 @@
           <a:p>
             <a:fld id="{08D12B45-3253-4A45-B8F9-2E00FEB0C480}" type="datetime1">
               <a:rPr lang="en-US" smtClean="0"/>
-              <a:t>11/15/2022</a:t>
+              <a:t>11/20/2022</a:t>
             </a:fld>
             <a:endParaRPr lang="en-US"/>
           </a:p>
@@ -17565,8 +17565,8 @@
           </a:p>
         </p:txBody>
       </p:sp>
-      <mc:AlternateContent xmlns:mc="http://schemas.openxmlformats.org/markup-compatibility/2006">
-        <mc:Choice xmlns:a14="http://schemas.microsoft.com/office/drawing/2010/main" Requires="a14">
+      <mc:AlternateContent xmlns:mc="http://schemas.openxmlformats.org/markup-compatibility/2006" xmlns:a14="http://schemas.microsoft.com/office/drawing/2010/main">
+        <mc:Choice Requires="a14">
           <p:sp>
             <p:nvSpPr>
               <p:cNvPr id="5" name="Oval 4">
@@ -17684,7 +17684,7 @@
             </p:txBody>
           </p:sp>
         </mc:Choice>
-        <mc:Fallback>
+        <mc:Fallback xmlns="">
           <p:sp>
             <p:nvSpPr>
               <p:cNvPr id="5" name="Oval 4">
@@ -19846,8 +19846,8 @@
           </p:sp>
         </mc:Fallback>
       </mc:AlternateContent>
-      <mc:AlternateContent xmlns:mc="http://schemas.openxmlformats.org/markup-compatibility/2006">
-        <mc:Choice xmlns:a14="http://schemas.microsoft.com/office/drawing/2010/main" Requires="a14">
+      <mc:AlternateContent xmlns:mc="http://schemas.openxmlformats.org/markup-compatibility/2006" xmlns:a14="http://schemas.microsoft.com/office/drawing/2010/main">
+        <mc:Choice Requires="a14">
           <p:graphicFrame>
             <p:nvGraphicFramePr>
               <p:cNvPr id="8" name="Table 132">
@@ -24341,7 +24341,7 @@
             </a:graphic>
           </p:graphicFrame>
         </mc:Choice>
-        <mc:Fallback>
+        <mc:Fallback xmlns="">
           <p:graphicFrame>
             <p:nvGraphicFramePr>
               <p:cNvPr id="8" name="Table 132">
@@ -28316,8 +28316,8 @@
           </a:p>
         </p:txBody>
       </p:sp>
-      <mc:AlternateContent xmlns:mc="http://schemas.openxmlformats.org/markup-compatibility/2006">
-        <mc:Choice xmlns:a14="http://schemas.microsoft.com/office/drawing/2010/main" Requires="a14">
+      <mc:AlternateContent xmlns:mc="http://schemas.openxmlformats.org/markup-compatibility/2006" xmlns:a14="http://schemas.microsoft.com/office/drawing/2010/main">
+        <mc:Choice Requires="a14">
           <p:sp>
             <p:nvSpPr>
               <p:cNvPr id="39" name="TextBox 38">
@@ -28398,7 +28398,7 @@
             </p:txBody>
           </p:sp>
         </mc:Choice>
-        <mc:Fallback>
+        <mc:Fallback xmlns="">
           <p:sp>
             <p:nvSpPr>
               <p:cNvPr id="39" name="TextBox 38">
@@ -31502,8 +31502,8 @@
           </a:fontRef>
         </p:style>
       </p:cxnSp>
-      <mc:AlternateContent xmlns:mc="http://schemas.openxmlformats.org/markup-compatibility/2006" xmlns:a14="http://schemas.microsoft.com/office/drawing/2010/main">
-        <mc:Choice Requires="a14">
+      <mc:AlternateContent xmlns:mc="http://schemas.openxmlformats.org/markup-compatibility/2006">
+        <mc:Choice xmlns:a14="http://schemas.microsoft.com/office/drawing/2010/main" Requires="a14">
           <p:sp>
             <p:nvSpPr>
               <p:cNvPr id="33" name="TextBox 32">
@@ -31711,13 +31711,13 @@
                       </m:sub>
                       <m:sup>
                         <m:r>
-                          <a:rPr lang="en-US" sz="1200" b="1" i="1" dirty="0">
+                          <a:rPr lang="en-US" sz="1200" b="1" i="1" dirty="0" smtClean="0">
                             <a:solidFill>
                               <a:sysClr val="windowText" lastClr="000000"/>
                             </a:solidFill>
                             <a:latin typeface="Cambria Math" panose="02040503050406030204" pitchFamily="18" charset="0"/>
                           </a:rPr>
-                          <m:t>∗</m:t>
+                          <m:t>𝒅</m:t>
                         </m:r>
                       </m:sup>
                     </m:sSubSup>
@@ -31932,7 +31932,7 @@
             </p:txBody>
           </p:sp>
         </mc:Choice>
-        <mc:Fallback xmlns="">
+        <mc:Fallback>
           <p:sp>
             <p:nvSpPr>
               <p:cNvPr id="33" name="TextBox 32">

</xml_diff>